<commit_message>
Readme, UseCase und PPT update
</commit_message>
<xml_diff>
--- a/PPI-H.OME.pptx
+++ b/PPI-H.OME.pptx
@@ -6,10 +6,12 @@
   </p:sldMasterIdLst>
   <p:sldIdLst>
     <p:sldId id="256" r:id="rId2"/>
-    <p:sldId id="257" r:id="rId3"/>
-    <p:sldId id="258" r:id="rId4"/>
-    <p:sldId id="259" r:id="rId5"/>
-    <p:sldId id="260" r:id="rId6"/>
+    <p:sldId id="261" r:id="rId3"/>
+    <p:sldId id="257" r:id="rId4"/>
+    <p:sldId id="258" r:id="rId5"/>
+    <p:sldId id="262" r:id="rId6"/>
+    <p:sldId id="259" r:id="rId7"/>
+    <p:sldId id="260" r:id="rId8"/>
   </p:sldIdLst>
   <p:sldSz cx="12192000" cy="6858000"/>
   <p:notesSz cx="6858000" cy="9144000"/>
@@ -372,7 +374,7 @@
           <a:p>
             <a:fld id="{129DED8E-2557-49DA-B491-E99CD4E6256F}" type="datetimeFigureOut">
               <a:rPr lang="de-DE" smtClean="0"/>
-              <a:t>14.01.2026</a:t>
+              <a:t>15.01.2026</a:t>
             </a:fld>
             <a:endParaRPr lang="de-DE" dirty="0"/>
           </a:p>
@@ -719,7 +721,7 @@
           <a:p>
             <a:fld id="{129DED8E-2557-49DA-B491-E99CD4E6256F}" type="datetimeFigureOut">
               <a:rPr lang="de-DE" smtClean="0"/>
-              <a:t>14.01.2026</a:t>
+              <a:t>15.01.2026</a:t>
             </a:fld>
             <a:endParaRPr lang="de-DE"/>
           </a:p>
@@ -1010,7 +1012,7 @@
           <a:p>
             <a:fld id="{129DED8E-2557-49DA-B491-E99CD4E6256F}" type="datetimeFigureOut">
               <a:rPr lang="de-DE" smtClean="0"/>
-              <a:t>14.01.2026</a:t>
+              <a:t>15.01.2026</a:t>
             </a:fld>
             <a:endParaRPr lang="de-DE"/>
           </a:p>
@@ -1208,7 +1210,7 @@
           <a:p>
             <a:fld id="{129DED8E-2557-49DA-B491-E99CD4E6256F}" type="datetimeFigureOut">
               <a:rPr lang="de-DE" smtClean="0"/>
-              <a:t>14.01.2026</a:t>
+              <a:t>15.01.2026</a:t>
             </a:fld>
             <a:endParaRPr lang="de-DE"/>
           </a:p>
@@ -1416,7 +1418,7 @@
           <a:p>
             <a:fld id="{129DED8E-2557-49DA-B491-E99CD4E6256F}" type="datetimeFigureOut">
               <a:rPr lang="de-DE" smtClean="0"/>
-              <a:t>14.01.2026</a:t>
+              <a:t>15.01.2026</a:t>
             </a:fld>
             <a:endParaRPr lang="de-DE"/>
           </a:p>
@@ -1529,7 +1531,7 @@
           <a:p>
             <a:fld id="{129DED8E-2557-49DA-B491-E99CD4E6256F}" type="datetimeFigureOut">
               <a:rPr lang="de-DE" smtClean="0"/>
-              <a:t>14.01.2026</a:t>
+              <a:t>15.01.2026</a:t>
             </a:fld>
             <a:endParaRPr lang="de-DE"/>
           </a:p>
@@ -1678,7 +1680,7 @@
           <a:p>
             <a:fld id="{129DED8E-2557-49DA-B491-E99CD4E6256F}" type="datetimeFigureOut">
               <a:rPr lang="de-DE" smtClean="0"/>
-              <a:t>14.01.2026</a:t>
+              <a:t>15.01.2026</a:t>
             </a:fld>
             <a:endParaRPr lang="de-DE"/>
           </a:p>
@@ -1879,7 +1881,7 @@
           <a:p>
             <a:fld id="{129DED8E-2557-49DA-B491-E99CD4E6256F}" type="datetimeFigureOut">
               <a:rPr lang="de-DE" smtClean="0"/>
-              <a:t>14.01.2026</a:t>
+              <a:t>15.01.2026</a:t>
             </a:fld>
             <a:endParaRPr lang="de-DE"/>
           </a:p>
@@ -2056,7 +2058,7 @@
           <a:p>
             <a:fld id="{129DED8E-2557-49DA-B491-E99CD4E6256F}" type="datetimeFigureOut">
               <a:rPr lang="de-DE" smtClean="0"/>
-              <a:t>14.01.2026</a:t>
+              <a:t>15.01.2026</a:t>
             </a:fld>
             <a:endParaRPr lang="de-DE"/>
           </a:p>
@@ -2306,7 +2308,7 @@
           <a:p>
             <a:fld id="{129DED8E-2557-49DA-B491-E99CD4E6256F}" type="datetimeFigureOut">
               <a:rPr lang="de-DE" smtClean="0"/>
-              <a:t>14.01.2026</a:t>
+              <a:t>15.01.2026</a:t>
             </a:fld>
             <a:endParaRPr lang="de-DE"/>
           </a:p>
@@ -2581,7 +2583,7 @@
           <a:p>
             <a:fld id="{129DED8E-2557-49DA-B491-E99CD4E6256F}" type="datetimeFigureOut">
               <a:rPr lang="de-DE" smtClean="0"/>
-              <a:t>14.01.2026</a:t>
+              <a:t>15.01.2026</a:t>
             </a:fld>
             <a:endParaRPr lang="de-DE"/>
           </a:p>
@@ -2846,7 +2848,7 @@
           <a:p>
             <a:fld id="{129DED8E-2557-49DA-B491-E99CD4E6256F}" type="datetimeFigureOut">
               <a:rPr lang="de-DE" smtClean="0"/>
-              <a:t>14.01.2026</a:t>
+              <a:t>15.01.2026</a:t>
             </a:fld>
             <a:endParaRPr lang="de-DE"/>
           </a:p>
@@ -3258,7 +3260,7 @@
           <a:p>
             <a:fld id="{129DED8E-2557-49DA-B491-E99CD4E6256F}" type="datetimeFigureOut">
               <a:rPr lang="de-DE" smtClean="0"/>
-              <a:t>14.01.2026</a:t>
+              <a:t>15.01.2026</a:t>
             </a:fld>
             <a:endParaRPr lang="de-DE"/>
           </a:p>
@@ -3548,7 +3550,7 @@
           <a:p>
             <a:fld id="{129DED8E-2557-49DA-B491-E99CD4E6256F}" type="datetimeFigureOut">
               <a:rPr lang="de-DE" smtClean="0"/>
-              <a:t>14.01.2026</a:t>
+              <a:t>15.01.2026</a:t>
             </a:fld>
             <a:endParaRPr lang="de-DE" dirty="0"/>
           </a:p>
@@ -4127,10 +4129,10 @@
       </p:grpSpPr>
       <p:sp>
         <p:nvSpPr>
-          <p:cNvPr id="6" name="Textfeld 5">
-            <a:extLst>
-              <a:ext uri="{FF2B5EF4-FFF2-40B4-BE49-F238E27FC236}">
-                <a16:creationId xmlns:a16="http://schemas.microsoft.com/office/drawing/2014/main" id="{89B4AD3A-5E81-9BEE-17F8-49100E2815BF}"/>
+          <p:cNvPr id="2" name="Textfeld 1">
+            <a:extLst>
+              <a:ext uri="{FF2B5EF4-FFF2-40B4-BE49-F238E27FC236}">
+                <a16:creationId xmlns:a16="http://schemas.microsoft.com/office/drawing/2014/main" id="{78D3D5E4-3E28-489E-D8FE-3855F73473F4}"/>
               </a:ext>
             </a:extLst>
           </p:cNvPr>
@@ -4139,7 +4141,50 @@
         </p:nvSpPr>
         <p:spPr>
           <a:xfrm>
-            <a:off x="506896" y="626303"/>
+            <a:off x="616225" y="248478"/>
+            <a:ext cx="11575775" cy="874644"/>
+          </a:xfrm>
+          <a:prstGeom prst="rect">
+            <a:avLst/>
+          </a:prstGeom>
+          <a:noFill/>
+        </p:spPr>
+        <p:txBody>
+          <a:bodyPr wrap="square" rtlCol="0">
+            <a:noAutofit/>
+          </a:bodyPr>
+          <a:lstStyle/>
+          <a:p>
+            <a:r>
+              <a:rPr lang="de-DE" sz="3600" b="1" dirty="0">
+                <a:latin typeface="+mj-lt"/>
+              </a:rPr>
+              <a:t>Projektbeschreibung</a:t>
+            </a:r>
+            <a:r>
+              <a:rPr lang="de-DE" dirty="0">
+                <a:latin typeface="+mj-lt"/>
+              </a:rPr>
+              <a:t> </a:t>
+            </a:r>
+          </a:p>
+        </p:txBody>
+      </p:sp>
+      <p:sp>
+        <p:nvSpPr>
+          <p:cNvPr id="3" name="Textfeld 2">
+            <a:extLst>
+              <a:ext uri="{FF2B5EF4-FFF2-40B4-BE49-F238E27FC236}">
+                <a16:creationId xmlns:a16="http://schemas.microsoft.com/office/drawing/2014/main" id="{941D13BC-9C43-9549-6BAC-66AEC8FE5612}"/>
+              </a:ext>
+            </a:extLst>
+          </p:cNvPr>
+          <p:cNvSpPr txBox="1"/>
+          <p:nvPr/>
+        </p:nvSpPr>
+        <p:spPr>
+          <a:xfrm>
+            <a:off x="764071" y="1252468"/>
             <a:ext cx="8597347" cy="5605532"/>
           </a:xfrm>
           <a:prstGeom prst="rect">
@@ -4158,8 +4203,12 @@
               <a:buChar char="•"/>
             </a:pPr>
             <a:r>
-              <a:rPr lang="de-DE" sz="3200" dirty="0"/>
-              <a:t>Haupteingang mit einem RFID Key öffnen</a:t>
+              <a:rPr lang="de-DE" sz="2400" dirty="0"/>
+              <a:t>Gebäude Security das </a:t>
+            </a:r>
+            <a:r>
+              <a:rPr lang="de-DE" sz="2400" b="1" dirty="0"/>
+              <a:t>mehrere Eingänge bewacht</a:t>
             </a:r>
           </a:p>
           <a:p>
@@ -4168,8 +4217,32 @@
               <a:buChar char="•"/>
             </a:pPr>
             <a:r>
-              <a:rPr lang="de-DE" sz="3200" dirty="0"/>
-              <a:t>Hintereingang mit dem einer Kamera überwachen</a:t>
+              <a:rPr lang="de-DE" sz="2400" dirty="0"/>
+              <a:t>Über eine </a:t>
+            </a:r>
+            <a:r>
+              <a:rPr lang="de-DE" sz="2400" b="1" dirty="0"/>
+              <a:t>Schalter</a:t>
+            </a:r>
+            <a:r>
+              <a:rPr lang="de-DE" sz="2400" dirty="0"/>
+              <a:t> soll ein </a:t>
+            </a:r>
+            <a:r>
+              <a:rPr lang="de-DE" sz="2400" b="1" dirty="0"/>
+              <a:t>Buzzer</a:t>
+            </a:r>
+            <a:r>
+              <a:rPr lang="de-DE" sz="2400" dirty="0"/>
+              <a:t> </a:t>
+            </a:r>
+            <a:r>
+              <a:rPr lang="de-DE" sz="2400" b="1" dirty="0"/>
+              <a:t>ertönen</a:t>
+            </a:r>
+            <a:r>
+              <a:rPr lang="de-DE" sz="2400" dirty="0"/>
+              <a:t> </a:t>
             </a:r>
           </a:p>
           <a:p>
@@ -4178,8 +4251,110 @@
               <a:buChar char="•"/>
             </a:pPr>
             <a:r>
-              <a:rPr lang="de-DE" sz="3200" dirty="0"/>
-              <a:t>Alle Aktivitäten werden auf der Security Seite angezeigt</a:t>
+              <a:rPr lang="de-DE" sz="2400" dirty="0"/>
+              <a:t>Und eine </a:t>
+            </a:r>
+            <a:r>
+              <a:rPr lang="de-DE" sz="2400" b="1" dirty="0"/>
+              <a:t>Kamera</a:t>
+            </a:r>
+            <a:r>
+              <a:rPr lang="de-DE" sz="2400" dirty="0"/>
+              <a:t> soll dabei </a:t>
+            </a:r>
+            <a:r>
+              <a:rPr lang="de-DE" sz="2400" b="1" dirty="0"/>
+              <a:t>Aufzeichnen</a:t>
+            </a:r>
+          </a:p>
+          <a:p>
+            <a:pPr marL="285750" indent="-285750">
+              <a:buFont typeface="Arial" panose="020B0604020202020204" pitchFamily="34" charset="0"/>
+              <a:buChar char="•"/>
+            </a:pPr>
+            <a:r>
+              <a:rPr lang="de-DE" sz="2400" dirty="0"/>
+              <a:t>Den </a:t>
+            </a:r>
+            <a:r>
+              <a:rPr lang="de-DE" sz="2400" b="1" dirty="0"/>
+              <a:t>Kamera-Feed</a:t>
+            </a:r>
+            <a:r>
+              <a:rPr lang="de-DE" sz="2400" dirty="0"/>
+              <a:t> kann man über eine </a:t>
+            </a:r>
+            <a:r>
+              <a:rPr lang="de-DE" sz="2400" b="1" dirty="0"/>
+              <a:t>Webseite</a:t>
+            </a:r>
+            <a:r>
+              <a:rPr lang="de-DE" sz="2400" dirty="0"/>
+              <a:t> sehen</a:t>
+            </a:r>
+          </a:p>
+          <a:p>
+            <a:pPr marL="285750" indent="-285750">
+              <a:buFont typeface="Arial" panose="020B0604020202020204" pitchFamily="34" charset="0"/>
+              <a:buChar char="•"/>
+            </a:pPr>
+            <a:r>
+              <a:rPr lang="de-DE" sz="2400" dirty="0"/>
+              <a:t>Über die </a:t>
+            </a:r>
+            <a:r>
+              <a:rPr lang="de-DE" sz="2400" b="1" dirty="0"/>
+              <a:t>Website</a:t>
+            </a:r>
+            <a:r>
+              <a:rPr lang="de-DE" sz="2400" dirty="0"/>
+              <a:t> kann dann der </a:t>
+            </a:r>
+            <a:r>
+              <a:rPr lang="de-DE" sz="2400" b="1" dirty="0"/>
+              <a:t>Bewegungssensor</a:t>
+            </a:r>
+            <a:r>
+              <a:rPr lang="de-DE" sz="2400" dirty="0"/>
+              <a:t> </a:t>
+            </a:r>
+            <a:r>
+              <a:rPr lang="de-DE" sz="2400" b="1" dirty="0"/>
+              <a:t>deaktiviert</a:t>
+            </a:r>
+            <a:r>
+              <a:rPr lang="de-DE" sz="2400" dirty="0"/>
+              <a:t> werden</a:t>
+            </a:r>
+          </a:p>
+          <a:p>
+            <a:pPr marL="285750" indent="-285750">
+              <a:buFont typeface="Arial" panose="020B0604020202020204" pitchFamily="34" charset="0"/>
+              <a:buChar char="•"/>
+            </a:pPr>
+            <a:r>
+              <a:rPr lang="de-DE" sz="2400" dirty="0"/>
+              <a:t>Mit einem </a:t>
+            </a:r>
+            <a:r>
+              <a:rPr lang="de-DE" sz="2400" b="1" dirty="0"/>
+              <a:t>RFID-Schlüssel</a:t>
+            </a:r>
+            <a:r>
+              <a:rPr lang="de-DE" sz="2400" dirty="0"/>
+              <a:t> kann man den </a:t>
+            </a:r>
+            <a:r>
+              <a:rPr lang="de-DE" sz="2400" b="1" dirty="0"/>
+              <a:t>Bewegungssensor</a:t>
+            </a:r>
+            <a:r>
+              <a:rPr lang="de-DE" sz="2400" dirty="0"/>
+              <a:t> auch </a:t>
+            </a:r>
+            <a:r>
+              <a:rPr lang="de-DE" sz="2400" b="1" dirty="0"/>
+              <a:t>deaktivieren</a:t>
             </a:r>
           </a:p>
         </p:txBody>
@@ -4187,7 +4362,7 @@
     </p:spTree>
     <p:extLst>
       <p:ext uri="{BB962C8B-B14F-4D97-AF65-F5344CB8AC3E}">
-        <p14:creationId xmlns:p14="http://schemas.microsoft.com/office/powerpoint/2010/main" val="701572175"/>
+        <p14:creationId xmlns:p14="http://schemas.microsoft.com/office/powerpoint/2010/main" val="1642404273"/>
       </p:ext>
     </p:extLst>
   </p:cSld>
@@ -4214,12 +4389,48 @@
           <a:chExt cx="0" cy="0"/>
         </a:xfrm>
       </p:grpSpPr>
-      <p:sp>
-        <p:nvSpPr>
-          <p:cNvPr id="2" name="Textfeld 1">
-            <a:extLst>
-              <a:ext uri="{FF2B5EF4-FFF2-40B4-BE49-F238E27FC236}">
-                <a16:creationId xmlns:a16="http://schemas.microsoft.com/office/drawing/2014/main" id="{9AFCA298-2AF1-32FB-FFB0-8096A07D3B75}"/>
+      <p:pic>
+        <p:nvPicPr>
+          <p:cNvPr id="5" name="Grafik 4" descr="Ein Bild, das Diagramm, Kreis, Text enthält.&#10;&#10;KI-generierte Inhalte können fehlerhaft sein.">
+            <a:extLst>
+              <a:ext uri="{FF2B5EF4-FFF2-40B4-BE49-F238E27FC236}">
+                <a16:creationId xmlns:a16="http://schemas.microsoft.com/office/drawing/2014/main" id="{D9686DF1-91AC-727C-1123-5D25F3DACFA6}"/>
+              </a:ext>
+            </a:extLst>
+          </p:cNvPr>
+          <p:cNvPicPr>
+            <a:picLocks noChangeAspect="1"/>
+          </p:cNvPicPr>
+          <p:nvPr/>
+        </p:nvPicPr>
+        <p:blipFill>
+          <a:blip r:embed="rId2">
+            <a:extLst>
+              <a:ext uri="{28A0092B-C50C-407E-A947-70E740481C1C}">
+                <a14:useLocalDpi xmlns:a14="http://schemas.microsoft.com/office/drawing/2010/main" val="0"/>
+              </a:ext>
+            </a:extLst>
+          </a:blip>
+          <a:stretch>
+            <a:fillRect/>
+          </a:stretch>
+        </p:blipFill>
+        <p:spPr>
+          <a:xfrm>
+            <a:off x="825910" y="1123122"/>
+            <a:ext cx="6511255" cy="5067996"/>
+          </a:xfrm>
+          <a:prstGeom prst="rect">
+            <a:avLst/>
+          </a:prstGeom>
+        </p:spPr>
+      </p:pic>
+      <p:sp>
+        <p:nvSpPr>
+          <p:cNvPr id="7" name="Textfeld 6">
+            <a:extLst>
+              <a:ext uri="{FF2B5EF4-FFF2-40B4-BE49-F238E27FC236}">
+                <a16:creationId xmlns:a16="http://schemas.microsoft.com/office/drawing/2014/main" id="{4684529E-C900-4B8C-16BD-35F7A5EF8F30}"/>
               </a:ext>
             </a:extLst>
           </p:cNvPr>
@@ -4243,10 +4454,16 @@
           <a:lstStyle/>
           <a:p>
             <a:r>
+              <a:rPr lang="de-DE" sz="3600" b="1" dirty="0" err="1">
+                <a:latin typeface="+mj-lt"/>
+              </a:rPr>
+              <a:t>UseCase</a:t>
+            </a:r>
+            <a:r>
               <a:rPr lang="de-DE" sz="3600" b="1" dirty="0">
                 <a:latin typeface="+mj-lt"/>
               </a:rPr>
-              <a:t>Haupteingang</a:t>
+              <a:t> Diagramm</a:t>
             </a:r>
             <a:r>
               <a:rPr lang="de-DE" dirty="0">
@@ -4257,66 +4474,10 @@
           </a:p>
         </p:txBody>
       </p:sp>
-      <p:sp>
-        <p:nvSpPr>
-          <p:cNvPr id="3" name="Textfeld 2">
-            <a:extLst>
-              <a:ext uri="{FF2B5EF4-FFF2-40B4-BE49-F238E27FC236}">
-                <a16:creationId xmlns:a16="http://schemas.microsoft.com/office/drawing/2014/main" id="{C9C8C551-3128-FD71-0210-258D85A34931}"/>
-              </a:ext>
-            </a:extLst>
-          </p:cNvPr>
-          <p:cNvSpPr txBox="1"/>
-          <p:nvPr/>
-        </p:nvSpPr>
-        <p:spPr>
-          <a:xfrm>
-            <a:off x="775252" y="1282148"/>
-            <a:ext cx="8338931" cy="4979504"/>
-          </a:xfrm>
-          <a:prstGeom prst="rect">
-            <a:avLst/>
-          </a:prstGeom>
-          <a:noFill/>
-        </p:spPr>
-        <p:txBody>
-          <a:bodyPr wrap="square" rtlCol="0">
-            <a:noAutofit/>
-          </a:bodyPr>
-          <a:lstStyle/>
-          <a:p>
-            <a:pPr marL="457200" indent="-457200">
-              <a:buFont typeface="Arial" panose="020B0604020202020204" pitchFamily="34" charset="0"/>
-              <a:buChar char="•"/>
-            </a:pPr>
-            <a:r>
-              <a:rPr lang="de-DE" sz="2800" dirty="0"/>
-              <a:t>Tür mit RFID öffnen</a:t>
-            </a:r>
-          </a:p>
-          <a:p>
-            <a:pPr marL="457200" indent="-457200">
-              <a:buFont typeface="Arial" panose="020B0604020202020204" pitchFamily="34" charset="0"/>
-              <a:buChar char="•"/>
-            </a:pPr>
-            <a:r>
-              <a:rPr lang="de-DE" sz="2800" dirty="0"/>
-              <a:t>Jedes Login wird auf der Security Website aufgezeichnet</a:t>
-            </a:r>
-          </a:p>
-          <a:p>
-            <a:pPr marL="457200" indent="-457200">
-              <a:buFont typeface="Arial" panose="020B0604020202020204" pitchFamily="34" charset="0"/>
-              <a:buChar char="•"/>
-            </a:pPr>
-            <a:endParaRPr lang="de-DE" sz="2800" dirty="0"/>
-          </a:p>
-        </p:txBody>
-      </p:sp>
     </p:spTree>
     <p:extLst>
       <p:ext uri="{BB962C8B-B14F-4D97-AF65-F5344CB8AC3E}">
-        <p14:creationId xmlns:p14="http://schemas.microsoft.com/office/powerpoint/2010/main" val="3850507946"/>
+        <p14:creationId xmlns:p14="http://schemas.microsoft.com/office/powerpoint/2010/main" val="701572175"/>
       </p:ext>
     </p:extLst>
   </p:cSld>
@@ -4348,6 +4509,270 @@
           <p:cNvPr id="2" name="Textfeld 1">
             <a:extLst>
               <a:ext uri="{FF2B5EF4-FFF2-40B4-BE49-F238E27FC236}">
+                <a16:creationId xmlns:a16="http://schemas.microsoft.com/office/drawing/2014/main" id="{9AFCA298-2AF1-32FB-FFB0-8096A07D3B75}"/>
+              </a:ext>
+            </a:extLst>
+          </p:cNvPr>
+          <p:cNvSpPr txBox="1"/>
+          <p:nvPr/>
+        </p:nvSpPr>
+        <p:spPr>
+          <a:xfrm>
+            <a:off x="616225" y="248478"/>
+            <a:ext cx="11575775" cy="874644"/>
+          </a:xfrm>
+          <a:prstGeom prst="rect">
+            <a:avLst/>
+          </a:prstGeom>
+          <a:noFill/>
+        </p:spPr>
+        <p:txBody>
+          <a:bodyPr wrap="square" rtlCol="0">
+            <a:noAutofit/>
+          </a:bodyPr>
+          <a:lstStyle/>
+          <a:p>
+            <a:r>
+              <a:rPr lang="de-DE" sz="3600" b="1" dirty="0">
+                <a:latin typeface="+mj-lt"/>
+              </a:rPr>
+              <a:t>Milestones 1</a:t>
+            </a:r>
+            <a:r>
+              <a:rPr lang="de-DE" dirty="0">
+                <a:latin typeface="+mj-lt"/>
+              </a:rPr>
+              <a:t> </a:t>
+            </a:r>
+          </a:p>
+        </p:txBody>
+      </p:sp>
+      <p:sp>
+        <p:nvSpPr>
+          <p:cNvPr id="3" name="Textfeld 2">
+            <a:extLst>
+              <a:ext uri="{FF2B5EF4-FFF2-40B4-BE49-F238E27FC236}">
+                <a16:creationId xmlns:a16="http://schemas.microsoft.com/office/drawing/2014/main" id="{C9C8C551-3128-FD71-0210-258D85A34931}"/>
+              </a:ext>
+            </a:extLst>
+          </p:cNvPr>
+          <p:cNvSpPr txBox="1"/>
+          <p:nvPr/>
+        </p:nvSpPr>
+        <p:spPr>
+          <a:xfrm>
+            <a:off x="775252" y="1282148"/>
+            <a:ext cx="8338931" cy="4979504"/>
+          </a:xfrm>
+          <a:prstGeom prst="rect">
+            <a:avLst/>
+          </a:prstGeom>
+          <a:noFill/>
+        </p:spPr>
+        <p:txBody>
+          <a:bodyPr wrap="square" rtlCol="0">
+            <a:noAutofit/>
+          </a:bodyPr>
+          <a:lstStyle/>
+          <a:p>
+            <a:pPr marL="457200" indent="-457200">
+              <a:buFont typeface="Arial" panose="020B0604020202020204" pitchFamily="34" charset="0"/>
+              <a:buChar char="•"/>
+            </a:pPr>
+            <a:r>
+              <a:rPr lang="de-DE" sz="2800" dirty="0"/>
+              <a:t>Tür mit RFID öffnen</a:t>
+            </a:r>
+          </a:p>
+          <a:p>
+            <a:pPr marL="457200" indent="-457200">
+              <a:buFont typeface="Arial" panose="020B0604020202020204" pitchFamily="34" charset="0"/>
+              <a:buChar char="•"/>
+            </a:pPr>
+            <a:r>
+              <a:rPr lang="de-DE" sz="2800" dirty="0"/>
+              <a:t>Jedes Login wird auf der Security Website aufgezeichnet</a:t>
+            </a:r>
+          </a:p>
+          <a:p>
+            <a:pPr marL="457200" indent="-457200">
+              <a:buFont typeface="Arial" panose="020B0604020202020204" pitchFamily="34" charset="0"/>
+              <a:buChar char="•"/>
+            </a:pPr>
+            <a:endParaRPr lang="de-DE" sz="2800" dirty="0"/>
+          </a:p>
+        </p:txBody>
+      </p:sp>
+    </p:spTree>
+    <p:extLst>
+      <p:ext uri="{BB962C8B-B14F-4D97-AF65-F5344CB8AC3E}">
+        <p14:creationId xmlns:p14="http://schemas.microsoft.com/office/powerpoint/2010/main" val="3850507946"/>
+      </p:ext>
+    </p:extLst>
+  </p:cSld>
+  <p:clrMapOvr>
+    <a:masterClrMapping/>
+  </p:clrMapOvr>
+</p:sld>
+</file>
+
+<file path=ppt/slides/slide5.xml><?xml version="1.0" encoding="utf-8"?>
+<p:sld xmlns:a="http://schemas.openxmlformats.org/drawingml/2006/main" xmlns:r="http://schemas.openxmlformats.org/officeDocument/2006/relationships" xmlns:p="http://schemas.openxmlformats.org/presentationml/2006/main">
+  <p:cSld>
+    <p:spTree>
+      <p:nvGrpSpPr>
+        <p:cNvPr id="1" name="">
+          <a:extLst>
+            <a:ext uri="{FF2B5EF4-FFF2-40B4-BE49-F238E27FC236}">
+              <a16:creationId xmlns:a16="http://schemas.microsoft.com/office/drawing/2014/main" id="{2DE66F69-C7D1-6114-A555-2A3F53557C39}"/>
+            </a:ext>
+          </a:extLst>
+        </p:cNvPr>
+        <p:cNvGrpSpPr/>
+        <p:nvPr/>
+      </p:nvGrpSpPr>
+      <p:grpSpPr>
+        <a:xfrm>
+          <a:off x="0" y="0"/>
+          <a:ext cx="0" cy="0"/>
+          <a:chOff x="0" y="0"/>
+          <a:chExt cx="0" cy="0"/>
+        </a:xfrm>
+      </p:grpSpPr>
+      <p:sp>
+        <p:nvSpPr>
+          <p:cNvPr id="2" name="Textfeld 1">
+            <a:extLst>
+              <a:ext uri="{FF2B5EF4-FFF2-40B4-BE49-F238E27FC236}">
+                <a16:creationId xmlns:a16="http://schemas.microsoft.com/office/drawing/2014/main" id="{45259379-AA4A-DB84-4889-8D7800F89F1C}"/>
+              </a:ext>
+            </a:extLst>
+          </p:cNvPr>
+          <p:cNvSpPr txBox="1"/>
+          <p:nvPr/>
+        </p:nvSpPr>
+        <p:spPr>
+          <a:xfrm>
+            <a:off x="616225" y="248478"/>
+            <a:ext cx="11575775" cy="874644"/>
+          </a:xfrm>
+          <a:prstGeom prst="rect">
+            <a:avLst/>
+          </a:prstGeom>
+          <a:noFill/>
+        </p:spPr>
+        <p:txBody>
+          <a:bodyPr wrap="square" rtlCol="0">
+            <a:noAutofit/>
+          </a:bodyPr>
+          <a:lstStyle/>
+          <a:p>
+            <a:r>
+              <a:rPr lang="de-DE" sz="3600" b="1" dirty="0">
+                <a:latin typeface="+mj-lt"/>
+              </a:rPr>
+              <a:t>Haupteingang</a:t>
+            </a:r>
+            <a:r>
+              <a:rPr lang="de-DE" dirty="0">
+                <a:latin typeface="+mj-lt"/>
+              </a:rPr>
+              <a:t> </a:t>
+            </a:r>
+          </a:p>
+        </p:txBody>
+      </p:sp>
+      <p:sp>
+        <p:nvSpPr>
+          <p:cNvPr id="3" name="Textfeld 2">
+            <a:extLst>
+              <a:ext uri="{FF2B5EF4-FFF2-40B4-BE49-F238E27FC236}">
+                <a16:creationId xmlns:a16="http://schemas.microsoft.com/office/drawing/2014/main" id="{5E4E3F98-87BA-EF32-99ED-1B18E18C932C}"/>
+              </a:ext>
+            </a:extLst>
+          </p:cNvPr>
+          <p:cNvSpPr txBox="1"/>
+          <p:nvPr/>
+        </p:nvSpPr>
+        <p:spPr>
+          <a:xfrm>
+            <a:off x="775252" y="1282148"/>
+            <a:ext cx="8338931" cy="4979504"/>
+          </a:xfrm>
+          <a:prstGeom prst="rect">
+            <a:avLst/>
+          </a:prstGeom>
+          <a:noFill/>
+        </p:spPr>
+        <p:txBody>
+          <a:bodyPr wrap="square" rtlCol="0">
+            <a:noAutofit/>
+          </a:bodyPr>
+          <a:lstStyle/>
+          <a:p>
+            <a:pPr marL="457200" indent="-457200">
+              <a:buFont typeface="Arial" panose="020B0604020202020204" pitchFamily="34" charset="0"/>
+              <a:buChar char="•"/>
+            </a:pPr>
+            <a:r>
+              <a:rPr lang="de-DE" sz="2800" dirty="0"/>
+              <a:t>Tür mit RFID öffnen</a:t>
+            </a:r>
+          </a:p>
+          <a:p>
+            <a:pPr marL="457200" indent="-457200">
+              <a:buFont typeface="Arial" panose="020B0604020202020204" pitchFamily="34" charset="0"/>
+              <a:buChar char="•"/>
+            </a:pPr>
+            <a:r>
+              <a:rPr lang="de-DE" sz="2800" dirty="0"/>
+              <a:t>Jedes Login wird auf der Security Website aufgezeichnet</a:t>
+            </a:r>
+          </a:p>
+          <a:p>
+            <a:pPr marL="457200" indent="-457200">
+              <a:buFont typeface="Arial" panose="020B0604020202020204" pitchFamily="34" charset="0"/>
+              <a:buChar char="•"/>
+            </a:pPr>
+            <a:endParaRPr lang="de-DE" sz="2800" dirty="0"/>
+          </a:p>
+        </p:txBody>
+      </p:sp>
+    </p:spTree>
+    <p:extLst>
+      <p:ext uri="{BB962C8B-B14F-4D97-AF65-F5344CB8AC3E}">
+        <p14:creationId xmlns:p14="http://schemas.microsoft.com/office/powerpoint/2010/main" val="521767037"/>
+      </p:ext>
+    </p:extLst>
+  </p:cSld>
+  <p:clrMapOvr>
+    <a:masterClrMapping/>
+  </p:clrMapOvr>
+</p:sld>
+</file>
+
+<file path=ppt/slides/slide6.xml><?xml version="1.0" encoding="utf-8"?>
+<p:sld xmlns:a="http://schemas.openxmlformats.org/drawingml/2006/main" xmlns:r="http://schemas.openxmlformats.org/officeDocument/2006/relationships" xmlns:p="http://schemas.openxmlformats.org/presentationml/2006/main">
+  <p:cSld>
+    <p:spTree>
+      <p:nvGrpSpPr>
+        <p:cNvPr id="1" name=""/>
+        <p:cNvGrpSpPr/>
+        <p:nvPr/>
+      </p:nvGrpSpPr>
+      <p:grpSpPr>
+        <a:xfrm>
+          <a:off x="0" y="0"/>
+          <a:ext cx="0" cy="0"/>
+          <a:chOff x="0" y="0"/>
+          <a:chExt cx="0" cy="0"/>
+        </a:xfrm>
+      </p:grpSpPr>
+      <p:sp>
+        <p:nvSpPr>
+          <p:cNvPr id="2" name="Textfeld 1">
+            <a:extLst>
+              <a:ext uri="{FF2B5EF4-FFF2-40B4-BE49-F238E27FC236}">
                 <a16:creationId xmlns:a16="http://schemas.microsoft.com/office/drawing/2014/main" id="{8AA86B21-F8F3-54DB-5CFC-167E0D2E21D9}"/>
               </a:ext>
             </a:extLst>
@@ -4472,7 +4897,7 @@
 </p:sld>
 </file>
 
-<file path=ppt/slides/slide5.xml><?xml version="1.0" encoding="utf-8"?>
+<file path=ppt/slides/slide7.xml><?xml version="1.0" encoding="utf-8"?>
 <p:sld xmlns:a="http://schemas.openxmlformats.org/drawingml/2006/main" xmlns:r="http://schemas.openxmlformats.org/officeDocument/2006/relationships" xmlns:p="http://schemas.openxmlformats.org/presentationml/2006/main">
   <p:cSld>
     <p:spTree>

</xml_diff>

<commit_message>
PPT und readme update
</commit_message>
<xml_diff>
--- a/PPI-H.OME.pptx
+++ b/PPI-H.OME.pptx
@@ -8,10 +8,13 @@
     <p:sldId id="256" r:id="rId2"/>
     <p:sldId id="261" r:id="rId3"/>
     <p:sldId id="257" r:id="rId4"/>
-    <p:sldId id="258" r:id="rId5"/>
-    <p:sldId id="262" r:id="rId6"/>
-    <p:sldId id="259" r:id="rId7"/>
-    <p:sldId id="260" r:id="rId8"/>
+    <p:sldId id="263" r:id="rId5"/>
+    <p:sldId id="258" r:id="rId6"/>
+    <p:sldId id="264" r:id="rId7"/>
+    <p:sldId id="265" r:id="rId8"/>
+    <p:sldId id="266" r:id="rId9"/>
+    <p:sldId id="259" r:id="rId10"/>
+    <p:sldId id="260" r:id="rId11"/>
   </p:sldIdLst>
   <p:sldSz cx="12192000" cy="6858000"/>
   <p:notesSz cx="6858000" cy="9144000"/>
@@ -374,7 +377,7 @@
           <a:p>
             <a:fld id="{129DED8E-2557-49DA-B491-E99CD4E6256F}" type="datetimeFigureOut">
               <a:rPr lang="de-DE" smtClean="0"/>
-              <a:t>15.01.2026</a:t>
+              <a:t>16.01.2026</a:t>
             </a:fld>
             <a:endParaRPr lang="de-DE" dirty="0"/>
           </a:p>
@@ -721,7 +724,7 @@
           <a:p>
             <a:fld id="{129DED8E-2557-49DA-B491-E99CD4E6256F}" type="datetimeFigureOut">
               <a:rPr lang="de-DE" smtClean="0"/>
-              <a:t>15.01.2026</a:t>
+              <a:t>16.01.2026</a:t>
             </a:fld>
             <a:endParaRPr lang="de-DE"/>
           </a:p>
@@ -1012,7 +1015,7 @@
           <a:p>
             <a:fld id="{129DED8E-2557-49DA-B491-E99CD4E6256F}" type="datetimeFigureOut">
               <a:rPr lang="de-DE" smtClean="0"/>
-              <a:t>15.01.2026</a:t>
+              <a:t>16.01.2026</a:t>
             </a:fld>
             <a:endParaRPr lang="de-DE"/>
           </a:p>
@@ -1210,7 +1213,7 @@
           <a:p>
             <a:fld id="{129DED8E-2557-49DA-B491-E99CD4E6256F}" type="datetimeFigureOut">
               <a:rPr lang="de-DE" smtClean="0"/>
-              <a:t>15.01.2026</a:t>
+              <a:t>16.01.2026</a:t>
             </a:fld>
             <a:endParaRPr lang="de-DE"/>
           </a:p>
@@ -1418,7 +1421,7 @@
           <a:p>
             <a:fld id="{129DED8E-2557-49DA-B491-E99CD4E6256F}" type="datetimeFigureOut">
               <a:rPr lang="de-DE" smtClean="0"/>
-              <a:t>15.01.2026</a:t>
+              <a:t>16.01.2026</a:t>
             </a:fld>
             <a:endParaRPr lang="de-DE"/>
           </a:p>
@@ -1531,7 +1534,7 @@
           <a:p>
             <a:fld id="{129DED8E-2557-49DA-B491-E99CD4E6256F}" type="datetimeFigureOut">
               <a:rPr lang="de-DE" smtClean="0"/>
-              <a:t>15.01.2026</a:t>
+              <a:t>16.01.2026</a:t>
             </a:fld>
             <a:endParaRPr lang="de-DE"/>
           </a:p>
@@ -1680,7 +1683,7 @@
           <a:p>
             <a:fld id="{129DED8E-2557-49DA-B491-E99CD4E6256F}" type="datetimeFigureOut">
               <a:rPr lang="de-DE" smtClean="0"/>
-              <a:t>15.01.2026</a:t>
+              <a:t>16.01.2026</a:t>
             </a:fld>
             <a:endParaRPr lang="de-DE"/>
           </a:p>
@@ -1881,7 +1884,7 @@
           <a:p>
             <a:fld id="{129DED8E-2557-49DA-B491-E99CD4E6256F}" type="datetimeFigureOut">
               <a:rPr lang="de-DE" smtClean="0"/>
-              <a:t>15.01.2026</a:t>
+              <a:t>16.01.2026</a:t>
             </a:fld>
             <a:endParaRPr lang="de-DE"/>
           </a:p>
@@ -2058,7 +2061,7 @@
           <a:p>
             <a:fld id="{129DED8E-2557-49DA-B491-E99CD4E6256F}" type="datetimeFigureOut">
               <a:rPr lang="de-DE" smtClean="0"/>
-              <a:t>15.01.2026</a:t>
+              <a:t>16.01.2026</a:t>
             </a:fld>
             <a:endParaRPr lang="de-DE"/>
           </a:p>
@@ -2308,7 +2311,7 @@
           <a:p>
             <a:fld id="{129DED8E-2557-49DA-B491-E99CD4E6256F}" type="datetimeFigureOut">
               <a:rPr lang="de-DE" smtClean="0"/>
-              <a:t>15.01.2026</a:t>
+              <a:t>16.01.2026</a:t>
             </a:fld>
             <a:endParaRPr lang="de-DE"/>
           </a:p>
@@ -2583,7 +2586,7 @@
           <a:p>
             <a:fld id="{129DED8E-2557-49DA-B491-E99CD4E6256F}" type="datetimeFigureOut">
               <a:rPr lang="de-DE" smtClean="0"/>
-              <a:t>15.01.2026</a:t>
+              <a:t>16.01.2026</a:t>
             </a:fld>
             <a:endParaRPr lang="de-DE"/>
           </a:p>
@@ -2848,7 +2851,7 @@
           <a:p>
             <a:fld id="{129DED8E-2557-49DA-B491-E99CD4E6256F}" type="datetimeFigureOut">
               <a:rPr lang="de-DE" smtClean="0"/>
-              <a:t>15.01.2026</a:t>
+              <a:t>16.01.2026</a:t>
             </a:fld>
             <a:endParaRPr lang="de-DE"/>
           </a:p>
@@ -3260,7 +3263,7 @@
           <a:p>
             <a:fld id="{129DED8E-2557-49DA-B491-E99CD4E6256F}" type="datetimeFigureOut">
               <a:rPr lang="de-DE" smtClean="0"/>
-              <a:t>15.01.2026</a:t>
+              <a:t>16.01.2026</a:t>
             </a:fld>
             <a:endParaRPr lang="de-DE"/>
           </a:p>
@@ -3550,7 +3553,7 @@
           <a:p>
             <a:fld id="{129DED8E-2557-49DA-B491-E99CD4E6256F}" type="datetimeFigureOut">
               <a:rPr lang="de-DE" smtClean="0"/>
-              <a:t>15.01.2026</a:t>
+              <a:t>16.01.2026</a:t>
             </a:fld>
             <a:endParaRPr lang="de-DE" dirty="0"/>
           </a:p>
@@ -4061,46 +4064,141 @@
           </a:p>
         </p:txBody>
       </p:sp>
-      <p:pic>
-        <p:nvPicPr>
-          <p:cNvPr id="4" name="Grafik 3" descr="Ein Bild, das Gebäude, Maßstabsmodell, draußen, Spielzeug enthält.&#10;&#10;KI-generierte Inhalte können fehlerhaft sein.">
-            <a:extLst>
-              <a:ext uri="{FF2B5EF4-FFF2-40B4-BE49-F238E27FC236}">
-                <a16:creationId xmlns:a16="http://schemas.microsoft.com/office/drawing/2014/main" id="{360275F4-86C3-6210-6946-158D40F0F2A0}"/>
-              </a:ext>
-            </a:extLst>
-          </p:cNvPr>
-          <p:cNvPicPr>
-            <a:picLocks noChangeAspect="1"/>
-          </p:cNvPicPr>
+    </p:spTree>
+    <p:extLst>
+      <p:ext uri="{BB962C8B-B14F-4D97-AF65-F5344CB8AC3E}">
+        <p14:creationId xmlns:p14="http://schemas.microsoft.com/office/powerpoint/2010/main" val="3387190297"/>
+      </p:ext>
+    </p:extLst>
+  </p:cSld>
+  <p:clrMapOvr>
+    <a:masterClrMapping/>
+  </p:clrMapOvr>
+</p:sld>
+</file>
+
+<file path=ppt/slides/slide10.xml><?xml version="1.0" encoding="utf-8"?>
+<p:sld xmlns:a="http://schemas.openxmlformats.org/drawingml/2006/main" xmlns:r="http://schemas.openxmlformats.org/officeDocument/2006/relationships" xmlns:p="http://schemas.openxmlformats.org/presentationml/2006/main">
+  <p:cSld>
+    <p:spTree>
+      <p:nvGrpSpPr>
+        <p:cNvPr id="1" name=""/>
+        <p:cNvGrpSpPr/>
+        <p:nvPr/>
+      </p:nvGrpSpPr>
+      <p:grpSpPr>
+        <a:xfrm>
+          <a:off x="0" y="0"/>
+          <a:ext cx="0" cy="0"/>
+          <a:chOff x="0" y="0"/>
+          <a:chExt cx="0" cy="0"/>
+        </a:xfrm>
+      </p:grpSpPr>
+      <p:sp>
+        <p:nvSpPr>
+          <p:cNvPr id="2" name="Textfeld 1">
+            <a:extLst>
+              <a:ext uri="{FF2B5EF4-FFF2-40B4-BE49-F238E27FC236}">
+                <a16:creationId xmlns:a16="http://schemas.microsoft.com/office/drawing/2014/main" id="{BC0B51EC-EEB9-9360-A11C-B8A9F4608EC3}"/>
+              </a:ext>
+            </a:extLst>
+          </p:cNvPr>
+          <p:cNvSpPr txBox="1"/>
           <p:nvPr/>
-        </p:nvPicPr>
-        <p:blipFill>
-          <a:blip r:embed="rId2">
-            <a:extLst>
-              <a:ext uri="{28A0092B-C50C-407E-A947-70E740481C1C}">
-                <a14:useLocalDpi xmlns:a14="http://schemas.microsoft.com/office/drawing/2010/main" val="0"/>
-              </a:ext>
-            </a:extLst>
-          </a:blip>
-          <a:stretch>
-            <a:fillRect/>
-          </a:stretch>
-        </p:blipFill>
+        </p:nvSpPr>
         <p:spPr>
           <a:xfrm>
-            <a:off x="509955" y="1376147"/>
-            <a:ext cx="7506721" cy="4222531"/>
+            <a:off x="616225" y="248478"/>
+            <a:ext cx="11575775" cy="874644"/>
           </a:xfrm>
           <a:prstGeom prst="rect">
             <a:avLst/>
           </a:prstGeom>
+          <a:noFill/>
         </p:spPr>
-      </p:pic>
+        <p:txBody>
+          <a:bodyPr wrap="square" rtlCol="0">
+            <a:noAutofit/>
+          </a:bodyPr>
+          <a:lstStyle/>
+          <a:p>
+            <a:r>
+              <a:rPr lang="de-DE" sz="3600" b="1" dirty="0">
+                <a:latin typeface="+mj-lt"/>
+              </a:rPr>
+              <a:t>Security Website</a:t>
+            </a:r>
+            <a:r>
+              <a:rPr lang="de-DE" dirty="0">
+                <a:latin typeface="+mj-lt"/>
+              </a:rPr>
+              <a:t> </a:t>
+            </a:r>
+          </a:p>
+        </p:txBody>
+      </p:sp>
+      <p:sp>
+        <p:nvSpPr>
+          <p:cNvPr id="3" name="Textfeld 2">
+            <a:extLst>
+              <a:ext uri="{FF2B5EF4-FFF2-40B4-BE49-F238E27FC236}">
+                <a16:creationId xmlns:a16="http://schemas.microsoft.com/office/drawing/2014/main" id="{074107CB-8008-E281-76A3-8CC614419D27}"/>
+              </a:ext>
+            </a:extLst>
+          </p:cNvPr>
+          <p:cNvSpPr txBox="1"/>
+          <p:nvPr/>
+        </p:nvSpPr>
+        <p:spPr>
+          <a:xfrm>
+            <a:off x="775252" y="1282148"/>
+            <a:ext cx="8338931" cy="4979504"/>
+          </a:xfrm>
+          <a:prstGeom prst="rect">
+            <a:avLst/>
+          </a:prstGeom>
+          <a:noFill/>
+        </p:spPr>
+        <p:txBody>
+          <a:bodyPr wrap="square" rtlCol="0">
+            <a:noAutofit/>
+          </a:bodyPr>
+          <a:lstStyle/>
+          <a:p>
+            <a:pPr marL="457200" indent="-457200">
+              <a:buFont typeface="Arial" panose="020B0604020202020204" pitchFamily="34" charset="0"/>
+              <a:buChar char="•"/>
+            </a:pPr>
+            <a:r>
+              <a:rPr lang="de-DE" sz="2800" dirty="0"/>
+              <a:t>Alle Aktivitäten werden </a:t>
+            </a:r>
+            <a:r>
+              <a:rPr lang="de-DE" sz="2800" dirty="0" err="1"/>
+              <a:t>gelogt</a:t>
+            </a:r>
+            <a:endParaRPr lang="de-DE" sz="2800" dirty="0"/>
+          </a:p>
+          <a:p>
+            <a:pPr marL="457200" indent="-457200">
+              <a:buFont typeface="Arial" panose="020B0604020202020204" pitchFamily="34" charset="0"/>
+              <a:buChar char="•"/>
+            </a:pPr>
+            <a:endParaRPr lang="de-DE" sz="2800" dirty="0"/>
+          </a:p>
+          <a:p>
+            <a:pPr marL="457200" indent="-457200">
+              <a:buFont typeface="Arial" panose="020B0604020202020204" pitchFamily="34" charset="0"/>
+              <a:buChar char="•"/>
+            </a:pPr>
+            <a:endParaRPr lang="de-DE" sz="2800" dirty="0"/>
+          </a:p>
+        </p:txBody>
+      </p:sp>
     </p:spTree>
     <p:extLst>
       <p:ext uri="{BB962C8B-B14F-4D97-AF65-F5344CB8AC3E}">
-        <p14:creationId xmlns:p14="http://schemas.microsoft.com/office/powerpoint/2010/main" val="3387190297"/>
+        <p14:creationId xmlns:p14="http://schemas.microsoft.com/office/powerpoint/2010/main" val="4087257320"/>
       </p:ext>
     </p:extLst>
   </p:cSld>
@@ -4389,42 +4487,6 @@
           <a:chExt cx="0" cy="0"/>
         </a:xfrm>
       </p:grpSpPr>
-      <p:pic>
-        <p:nvPicPr>
-          <p:cNvPr id="5" name="Grafik 4" descr="Ein Bild, das Diagramm, Kreis, Text enthält.&#10;&#10;KI-generierte Inhalte können fehlerhaft sein.">
-            <a:extLst>
-              <a:ext uri="{FF2B5EF4-FFF2-40B4-BE49-F238E27FC236}">
-                <a16:creationId xmlns:a16="http://schemas.microsoft.com/office/drawing/2014/main" id="{D9686DF1-91AC-727C-1123-5D25F3DACFA6}"/>
-              </a:ext>
-            </a:extLst>
-          </p:cNvPr>
-          <p:cNvPicPr>
-            <a:picLocks noChangeAspect="1"/>
-          </p:cNvPicPr>
-          <p:nvPr/>
-        </p:nvPicPr>
-        <p:blipFill>
-          <a:blip r:embed="rId2">
-            <a:extLst>
-              <a:ext uri="{28A0092B-C50C-407E-A947-70E740481C1C}">
-                <a14:useLocalDpi xmlns:a14="http://schemas.microsoft.com/office/drawing/2010/main" val="0"/>
-              </a:ext>
-            </a:extLst>
-          </a:blip>
-          <a:stretch>
-            <a:fillRect/>
-          </a:stretch>
-        </p:blipFill>
-        <p:spPr>
-          <a:xfrm>
-            <a:off x="825910" y="1123122"/>
-            <a:ext cx="6511255" cy="5067996"/>
-          </a:xfrm>
-          <a:prstGeom prst="rect">
-            <a:avLst/>
-          </a:prstGeom>
-        </p:spPr>
-      </p:pic>
       <p:sp>
         <p:nvSpPr>
           <p:cNvPr id="7" name="Textfeld 6">
@@ -4474,6 +4536,43 @@
           </a:p>
         </p:txBody>
       </p:sp>
+      <p:pic>
+        <p:nvPicPr>
+          <p:cNvPr id="3" name="Grafik 2" descr="Ein Bild, das Entwurf, Zeichnung, Diagramm, Lineart enthält.&#10;&#10;KI-generierte Inhalte können fehlerhaft sein.">
+            <a:extLst>
+              <a:ext uri="{FF2B5EF4-FFF2-40B4-BE49-F238E27FC236}">
+                <a16:creationId xmlns:a16="http://schemas.microsoft.com/office/drawing/2014/main" id="{8BBC2928-0FCC-2266-A4DC-57C3C76EEE7F}"/>
+              </a:ext>
+            </a:extLst>
+          </p:cNvPr>
+          <p:cNvPicPr>
+            <a:picLocks noChangeAspect="1"/>
+          </p:cNvPicPr>
+          <p:nvPr/>
+        </p:nvPicPr>
+        <p:blipFill>
+          <a:blip r:embed="rId2">
+            <a:extLst>
+              <a:ext uri="{28A0092B-C50C-407E-A947-70E740481C1C}">
+                <a14:useLocalDpi xmlns:a14="http://schemas.microsoft.com/office/drawing/2010/main" val="0"/>
+              </a:ext>
+            </a:extLst>
+          </a:blip>
+          <a:srcRect b="50000"/>
+          <a:stretch>
+            <a:fillRect/>
+          </a:stretch>
+        </p:blipFill>
+        <p:spPr>
+          <a:xfrm>
+            <a:off x="787674" y="1008822"/>
+            <a:ext cx="6308451" cy="5520894"/>
+          </a:xfrm>
+          <a:prstGeom prst="rect">
+            <a:avLst/>
+          </a:prstGeom>
+        </p:spPr>
+      </p:pic>
     </p:spTree>
     <p:extLst>
       <p:ext uri="{BB962C8B-B14F-4D97-AF65-F5344CB8AC3E}">
@@ -4504,12 +4603,49 @@
           <a:chExt cx="0" cy="0"/>
         </a:xfrm>
       </p:grpSpPr>
-      <p:sp>
-        <p:nvSpPr>
-          <p:cNvPr id="2" name="Textfeld 1">
-            <a:extLst>
-              <a:ext uri="{FF2B5EF4-FFF2-40B4-BE49-F238E27FC236}">
-                <a16:creationId xmlns:a16="http://schemas.microsoft.com/office/drawing/2014/main" id="{9AFCA298-2AF1-32FB-FFB0-8096A07D3B75}"/>
+      <p:pic>
+        <p:nvPicPr>
+          <p:cNvPr id="3" name="Grafik 2" descr="Ein Bild, das Entwurf, Zeichnung, Diagramm, Lineart enthält.&#10;&#10;KI-generierte Inhalte können fehlerhaft sein.">
+            <a:extLst>
+              <a:ext uri="{FF2B5EF4-FFF2-40B4-BE49-F238E27FC236}">
+                <a16:creationId xmlns:a16="http://schemas.microsoft.com/office/drawing/2014/main" id="{7D2139BC-2F7F-1920-0445-3EC2AB4C775D}"/>
+              </a:ext>
+            </a:extLst>
+          </p:cNvPr>
+          <p:cNvPicPr>
+            <a:picLocks noChangeAspect="1"/>
+          </p:cNvPicPr>
+          <p:nvPr/>
+        </p:nvPicPr>
+        <p:blipFill>
+          <a:blip r:embed="rId2">
+            <a:extLst>
+              <a:ext uri="{28A0092B-C50C-407E-A947-70E740481C1C}">
+                <a14:useLocalDpi xmlns:a14="http://schemas.microsoft.com/office/drawing/2010/main" val="0"/>
+              </a:ext>
+            </a:extLst>
+          </a:blip>
+          <a:srcRect t="50000"/>
+          <a:stretch>
+            <a:fillRect/>
+          </a:stretch>
+        </p:blipFill>
+        <p:spPr>
+          <a:xfrm>
+            <a:off x="755550" y="695325"/>
+            <a:ext cx="6312571" cy="5524500"/>
+          </a:xfrm>
+          <a:prstGeom prst="rect">
+            <a:avLst/>
+          </a:prstGeom>
+        </p:spPr>
+      </p:pic>
+      <p:sp>
+        <p:nvSpPr>
+          <p:cNvPr id="4" name="Textfeld 3">
+            <a:extLst>
+              <a:ext uri="{FF2B5EF4-FFF2-40B4-BE49-F238E27FC236}">
+                <a16:creationId xmlns:a16="http://schemas.microsoft.com/office/drawing/2014/main" id="{813398C4-35A5-5C6A-BDF4-279CD8354BBE}"/>
               </a:ext>
             </a:extLst>
           </p:cNvPr>
@@ -4533,10 +4669,16 @@
           <a:lstStyle/>
           <a:p>
             <a:r>
+              <a:rPr lang="de-DE" sz="3600" b="1" dirty="0" err="1">
+                <a:latin typeface="+mj-lt"/>
+              </a:rPr>
+              <a:t>UseCase</a:t>
+            </a:r>
+            <a:r>
               <a:rPr lang="de-DE" sz="3600" b="1" dirty="0">
                 <a:latin typeface="+mj-lt"/>
               </a:rPr>
-              <a:t>Milestones 1</a:t>
+              <a:t> Diagramm</a:t>
             </a:r>
             <a:r>
               <a:rPr lang="de-DE" dirty="0">
@@ -4547,66 +4689,10 @@
           </a:p>
         </p:txBody>
       </p:sp>
-      <p:sp>
-        <p:nvSpPr>
-          <p:cNvPr id="3" name="Textfeld 2">
-            <a:extLst>
-              <a:ext uri="{FF2B5EF4-FFF2-40B4-BE49-F238E27FC236}">
-                <a16:creationId xmlns:a16="http://schemas.microsoft.com/office/drawing/2014/main" id="{C9C8C551-3128-FD71-0210-258D85A34931}"/>
-              </a:ext>
-            </a:extLst>
-          </p:cNvPr>
-          <p:cNvSpPr txBox="1"/>
-          <p:nvPr/>
-        </p:nvSpPr>
-        <p:spPr>
-          <a:xfrm>
-            <a:off x="775252" y="1282148"/>
-            <a:ext cx="8338931" cy="4979504"/>
-          </a:xfrm>
-          <a:prstGeom prst="rect">
-            <a:avLst/>
-          </a:prstGeom>
-          <a:noFill/>
-        </p:spPr>
-        <p:txBody>
-          <a:bodyPr wrap="square" rtlCol="0">
-            <a:noAutofit/>
-          </a:bodyPr>
-          <a:lstStyle/>
-          <a:p>
-            <a:pPr marL="457200" indent="-457200">
-              <a:buFont typeface="Arial" panose="020B0604020202020204" pitchFamily="34" charset="0"/>
-              <a:buChar char="•"/>
-            </a:pPr>
-            <a:r>
-              <a:rPr lang="de-DE" sz="2800" dirty="0"/>
-              <a:t>Tür mit RFID öffnen</a:t>
-            </a:r>
-          </a:p>
-          <a:p>
-            <a:pPr marL="457200" indent="-457200">
-              <a:buFont typeface="Arial" panose="020B0604020202020204" pitchFamily="34" charset="0"/>
-              <a:buChar char="•"/>
-            </a:pPr>
-            <a:r>
-              <a:rPr lang="de-DE" sz="2800" dirty="0"/>
-              <a:t>Jedes Login wird auf der Security Website aufgezeichnet</a:t>
-            </a:r>
-          </a:p>
-          <a:p>
-            <a:pPr marL="457200" indent="-457200">
-              <a:buFont typeface="Arial" panose="020B0604020202020204" pitchFamily="34" charset="0"/>
-              <a:buChar char="•"/>
-            </a:pPr>
-            <a:endParaRPr lang="de-DE" sz="2800" dirty="0"/>
-          </a:p>
-        </p:txBody>
-      </p:sp>
     </p:spTree>
     <p:extLst>
       <p:ext uri="{BB962C8B-B14F-4D97-AF65-F5344CB8AC3E}">
-        <p14:creationId xmlns:p14="http://schemas.microsoft.com/office/powerpoint/2010/main" val="3850507946"/>
+        <p14:creationId xmlns:p14="http://schemas.microsoft.com/office/powerpoint/2010/main" val="2979570786"/>
       </p:ext>
     </p:extLst>
   </p:cSld>
@@ -4617,141 +4703,6 @@
 </file>
 
 <file path=ppt/slides/slide5.xml><?xml version="1.0" encoding="utf-8"?>
-<p:sld xmlns:a="http://schemas.openxmlformats.org/drawingml/2006/main" xmlns:r="http://schemas.openxmlformats.org/officeDocument/2006/relationships" xmlns:p="http://schemas.openxmlformats.org/presentationml/2006/main">
-  <p:cSld>
-    <p:spTree>
-      <p:nvGrpSpPr>
-        <p:cNvPr id="1" name="">
-          <a:extLst>
-            <a:ext uri="{FF2B5EF4-FFF2-40B4-BE49-F238E27FC236}">
-              <a16:creationId xmlns:a16="http://schemas.microsoft.com/office/drawing/2014/main" id="{2DE66F69-C7D1-6114-A555-2A3F53557C39}"/>
-            </a:ext>
-          </a:extLst>
-        </p:cNvPr>
-        <p:cNvGrpSpPr/>
-        <p:nvPr/>
-      </p:nvGrpSpPr>
-      <p:grpSpPr>
-        <a:xfrm>
-          <a:off x="0" y="0"/>
-          <a:ext cx="0" cy="0"/>
-          <a:chOff x="0" y="0"/>
-          <a:chExt cx="0" cy="0"/>
-        </a:xfrm>
-      </p:grpSpPr>
-      <p:sp>
-        <p:nvSpPr>
-          <p:cNvPr id="2" name="Textfeld 1">
-            <a:extLst>
-              <a:ext uri="{FF2B5EF4-FFF2-40B4-BE49-F238E27FC236}">
-                <a16:creationId xmlns:a16="http://schemas.microsoft.com/office/drawing/2014/main" id="{45259379-AA4A-DB84-4889-8D7800F89F1C}"/>
-              </a:ext>
-            </a:extLst>
-          </p:cNvPr>
-          <p:cNvSpPr txBox="1"/>
-          <p:nvPr/>
-        </p:nvSpPr>
-        <p:spPr>
-          <a:xfrm>
-            <a:off x="616225" y="248478"/>
-            <a:ext cx="11575775" cy="874644"/>
-          </a:xfrm>
-          <a:prstGeom prst="rect">
-            <a:avLst/>
-          </a:prstGeom>
-          <a:noFill/>
-        </p:spPr>
-        <p:txBody>
-          <a:bodyPr wrap="square" rtlCol="0">
-            <a:noAutofit/>
-          </a:bodyPr>
-          <a:lstStyle/>
-          <a:p>
-            <a:r>
-              <a:rPr lang="de-DE" sz="3600" b="1" dirty="0">
-                <a:latin typeface="+mj-lt"/>
-              </a:rPr>
-              <a:t>Haupteingang</a:t>
-            </a:r>
-            <a:r>
-              <a:rPr lang="de-DE" dirty="0">
-                <a:latin typeface="+mj-lt"/>
-              </a:rPr>
-              <a:t> </a:t>
-            </a:r>
-          </a:p>
-        </p:txBody>
-      </p:sp>
-      <p:sp>
-        <p:nvSpPr>
-          <p:cNvPr id="3" name="Textfeld 2">
-            <a:extLst>
-              <a:ext uri="{FF2B5EF4-FFF2-40B4-BE49-F238E27FC236}">
-                <a16:creationId xmlns:a16="http://schemas.microsoft.com/office/drawing/2014/main" id="{5E4E3F98-87BA-EF32-99ED-1B18E18C932C}"/>
-              </a:ext>
-            </a:extLst>
-          </p:cNvPr>
-          <p:cNvSpPr txBox="1"/>
-          <p:nvPr/>
-        </p:nvSpPr>
-        <p:spPr>
-          <a:xfrm>
-            <a:off x="775252" y="1282148"/>
-            <a:ext cx="8338931" cy="4979504"/>
-          </a:xfrm>
-          <a:prstGeom prst="rect">
-            <a:avLst/>
-          </a:prstGeom>
-          <a:noFill/>
-        </p:spPr>
-        <p:txBody>
-          <a:bodyPr wrap="square" rtlCol="0">
-            <a:noAutofit/>
-          </a:bodyPr>
-          <a:lstStyle/>
-          <a:p>
-            <a:pPr marL="457200" indent="-457200">
-              <a:buFont typeface="Arial" panose="020B0604020202020204" pitchFamily="34" charset="0"/>
-              <a:buChar char="•"/>
-            </a:pPr>
-            <a:r>
-              <a:rPr lang="de-DE" sz="2800" dirty="0"/>
-              <a:t>Tür mit RFID öffnen</a:t>
-            </a:r>
-          </a:p>
-          <a:p>
-            <a:pPr marL="457200" indent="-457200">
-              <a:buFont typeface="Arial" panose="020B0604020202020204" pitchFamily="34" charset="0"/>
-              <a:buChar char="•"/>
-            </a:pPr>
-            <a:r>
-              <a:rPr lang="de-DE" sz="2800" dirty="0"/>
-              <a:t>Jedes Login wird auf der Security Website aufgezeichnet</a:t>
-            </a:r>
-          </a:p>
-          <a:p>
-            <a:pPr marL="457200" indent="-457200">
-              <a:buFont typeface="Arial" panose="020B0604020202020204" pitchFamily="34" charset="0"/>
-              <a:buChar char="•"/>
-            </a:pPr>
-            <a:endParaRPr lang="de-DE" sz="2800" dirty="0"/>
-          </a:p>
-        </p:txBody>
-      </p:sp>
-    </p:spTree>
-    <p:extLst>
-      <p:ext uri="{BB962C8B-B14F-4D97-AF65-F5344CB8AC3E}">
-        <p14:creationId xmlns:p14="http://schemas.microsoft.com/office/powerpoint/2010/main" val="521767037"/>
-      </p:ext>
-    </p:extLst>
-  </p:cSld>
-  <p:clrMapOvr>
-    <a:masterClrMapping/>
-  </p:clrMapOvr>
-</p:sld>
-</file>
-
-<file path=ppt/slides/slide6.xml><?xml version="1.0" encoding="utf-8"?>
 <p:sld xmlns:a="http://schemas.openxmlformats.org/drawingml/2006/main" xmlns:r="http://schemas.openxmlformats.org/officeDocument/2006/relationships" xmlns:p="http://schemas.openxmlformats.org/presentationml/2006/main">
   <p:cSld>
     <p:spTree>
@@ -4773,7 +4724,7 @@
           <p:cNvPr id="2" name="Textfeld 1">
             <a:extLst>
               <a:ext uri="{FF2B5EF4-FFF2-40B4-BE49-F238E27FC236}">
-                <a16:creationId xmlns:a16="http://schemas.microsoft.com/office/drawing/2014/main" id="{8AA86B21-F8F3-54DB-5CFC-167E0D2E21D9}"/>
+                <a16:creationId xmlns:a16="http://schemas.microsoft.com/office/drawing/2014/main" id="{9AFCA298-2AF1-32FB-FFB0-8096A07D3B75}"/>
               </a:ext>
             </a:extLst>
           </p:cNvPr>
@@ -4800,7 +4751,7 @@
               <a:rPr lang="de-DE" sz="3600" b="1" dirty="0">
                 <a:latin typeface="+mj-lt"/>
               </a:rPr>
-              <a:t>Hintereingang</a:t>
+              <a:t>Milestones 1 – V1 </a:t>
             </a:r>
             <a:r>
               <a:rPr lang="de-DE" dirty="0">
@@ -4816,7 +4767,7 @@
           <p:cNvPr id="3" name="Textfeld 2">
             <a:extLst>
               <a:ext uri="{FF2B5EF4-FFF2-40B4-BE49-F238E27FC236}">
-                <a16:creationId xmlns:a16="http://schemas.microsoft.com/office/drawing/2014/main" id="{A2F0884C-9782-1D3D-161B-C44114174FDF}"/>
+                <a16:creationId xmlns:a16="http://schemas.microsoft.com/office/drawing/2014/main" id="{C9C8C551-3128-FD71-0210-258D85A34931}"/>
               </a:ext>
             </a:extLst>
           </p:cNvPr>
@@ -4845,7 +4796,7 @@
             </a:pPr>
             <a:r>
               <a:rPr lang="de-DE" sz="2800" dirty="0"/>
-              <a:t>Bewegungssensor aktiviert eine Kamera</a:t>
+              <a:t>Taster löst Buzzer (2sek) aus und aktiviert die Kamera</a:t>
             </a:r>
           </a:p>
           <a:p>
@@ -4855,17 +4806,7 @@
             </a:pPr>
             <a:r>
               <a:rPr lang="de-DE" sz="2800" dirty="0"/>
-              <a:t>Foto wird aufgenommen </a:t>
-            </a:r>
-          </a:p>
-          <a:p>
-            <a:pPr marL="457200" indent="-457200">
-              <a:buFont typeface="Arial" panose="020B0604020202020204" pitchFamily="34" charset="0"/>
-              <a:buChar char="•"/>
-            </a:pPr>
-            <a:r>
-              <a:rPr lang="de-DE" sz="2800" dirty="0"/>
-              <a:t>Fotos werden auf der Security Seite angezeigt</a:t>
+              <a:t>Bewegungssensor im Haus ist dauerhaft aktiv</a:t>
             </a:r>
           </a:p>
           <a:p>
@@ -4875,6 +4816,134 @@
             </a:pPr>
             <a:endParaRPr lang="de-DE" sz="2800" dirty="0"/>
           </a:p>
+        </p:txBody>
+      </p:sp>
+    </p:spTree>
+    <p:extLst>
+      <p:ext uri="{BB962C8B-B14F-4D97-AF65-F5344CB8AC3E}">
+        <p14:creationId xmlns:p14="http://schemas.microsoft.com/office/powerpoint/2010/main" val="3850507946"/>
+      </p:ext>
+    </p:extLst>
+  </p:cSld>
+  <p:clrMapOvr>
+    <a:masterClrMapping/>
+  </p:clrMapOvr>
+</p:sld>
+</file>
+
+<file path=ppt/slides/slide6.xml><?xml version="1.0" encoding="utf-8"?>
+<p:sld xmlns:a="http://schemas.openxmlformats.org/drawingml/2006/main" xmlns:r="http://schemas.openxmlformats.org/officeDocument/2006/relationships" xmlns:p="http://schemas.openxmlformats.org/presentationml/2006/main">
+  <p:cSld>
+    <p:spTree>
+      <p:nvGrpSpPr>
+        <p:cNvPr id="1" name="">
+          <a:extLst>
+            <a:ext uri="{FF2B5EF4-FFF2-40B4-BE49-F238E27FC236}">
+              <a16:creationId xmlns:a16="http://schemas.microsoft.com/office/drawing/2014/main" id="{306BF07E-EE77-DCB5-F10D-789AEBCA7F07}"/>
+            </a:ext>
+          </a:extLst>
+        </p:cNvPr>
+        <p:cNvGrpSpPr/>
+        <p:nvPr/>
+      </p:nvGrpSpPr>
+      <p:grpSpPr>
+        <a:xfrm>
+          <a:off x="0" y="0"/>
+          <a:ext cx="0" cy="0"/>
+          <a:chOff x="0" y="0"/>
+          <a:chExt cx="0" cy="0"/>
+        </a:xfrm>
+      </p:grpSpPr>
+      <p:sp>
+        <p:nvSpPr>
+          <p:cNvPr id="2" name="Textfeld 1">
+            <a:extLst>
+              <a:ext uri="{FF2B5EF4-FFF2-40B4-BE49-F238E27FC236}">
+                <a16:creationId xmlns:a16="http://schemas.microsoft.com/office/drawing/2014/main" id="{A7894117-6B0B-11AE-8FB7-FB8D7ED610BF}"/>
+              </a:ext>
+            </a:extLst>
+          </p:cNvPr>
+          <p:cNvSpPr txBox="1"/>
+          <p:nvPr/>
+        </p:nvSpPr>
+        <p:spPr>
+          <a:xfrm>
+            <a:off x="616225" y="248478"/>
+            <a:ext cx="11575775" cy="874644"/>
+          </a:xfrm>
+          <a:prstGeom prst="rect">
+            <a:avLst/>
+          </a:prstGeom>
+          <a:noFill/>
+        </p:spPr>
+        <p:txBody>
+          <a:bodyPr wrap="square" rtlCol="0">
+            <a:noAutofit/>
+          </a:bodyPr>
+          <a:lstStyle/>
+          <a:p>
+            <a:r>
+              <a:rPr lang="de-DE" sz="3600" b="1" dirty="0">
+                <a:latin typeface="+mj-lt"/>
+              </a:rPr>
+              <a:t>Milestones 1 – V2 </a:t>
+            </a:r>
+            <a:r>
+              <a:rPr lang="de-DE" dirty="0">
+                <a:latin typeface="+mj-lt"/>
+              </a:rPr>
+              <a:t> </a:t>
+            </a:r>
+          </a:p>
+        </p:txBody>
+      </p:sp>
+      <p:sp>
+        <p:nvSpPr>
+          <p:cNvPr id="3" name="Textfeld 2">
+            <a:extLst>
+              <a:ext uri="{FF2B5EF4-FFF2-40B4-BE49-F238E27FC236}">
+                <a16:creationId xmlns:a16="http://schemas.microsoft.com/office/drawing/2014/main" id="{EA110DCB-005E-9DE3-79DE-97CA99688CE5}"/>
+              </a:ext>
+            </a:extLst>
+          </p:cNvPr>
+          <p:cNvSpPr txBox="1"/>
+          <p:nvPr/>
+        </p:nvSpPr>
+        <p:spPr>
+          <a:xfrm>
+            <a:off x="775252" y="1282148"/>
+            <a:ext cx="8338931" cy="4979504"/>
+          </a:xfrm>
+          <a:prstGeom prst="rect">
+            <a:avLst/>
+          </a:prstGeom>
+          <a:noFill/>
+        </p:spPr>
+        <p:txBody>
+          <a:bodyPr wrap="square" rtlCol="0">
+            <a:noAutofit/>
+          </a:bodyPr>
+          <a:lstStyle/>
+          <a:p>
+            <a:pPr marL="457200" indent="-457200">
+              <a:buFont typeface="Arial" panose="020B0604020202020204" pitchFamily="34" charset="0"/>
+              <a:buChar char="•"/>
+            </a:pPr>
+            <a:r>
+              <a:rPr lang="de-DE" sz="2800" dirty="0"/>
+              <a:t>Tür mit RFID gesichert</a:t>
+            </a:r>
+          </a:p>
+          <a:p>
+            <a:pPr marL="457200" indent="-457200">
+              <a:buFont typeface="Arial" panose="020B0604020202020204" pitchFamily="34" charset="0"/>
+              <a:buChar char="•"/>
+            </a:pPr>
+            <a:r>
+              <a:rPr lang="de-DE" sz="2800" dirty="0"/>
+              <a:t>Mit gültigen Key Tür öffnen</a:t>
+            </a:r>
+          </a:p>
           <a:p>
             <a:pPr marL="457200" indent="-457200">
               <a:buFont typeface="Arial" panose="020B0604020202020204" pitchFamily="34" charset="0"/>
@@ -4887,7 +4956,7 @@
     </p:spTree>
     <p:extLst>
       <p:ext uri="{BB962C8B-B14F-4D97-AF65-F5344CB8AC3E}">
-        <p14:creationId xmlns:p14="http://schemas.microsoft.com/office/powerpoint/2010/main" val="2838508329"/>
+        <p14:creationId xmlns:p14="http://schemas.microsoft.com/office/powerpoint/2010/main" val="3282966244"/>
       </p:ext>
     </p:extLst>
   </p:cSld>
@@ -4898,6 +4967,273 @@
 </file>
 
 <file path=ppt/slides/slide7.xml><?xml version="1.0" encoding="utf-8"?>
+<p:sld xmlns:a="http://schemas.openxmlformats.org/drawingml/2006/main" xmlns:r="http://schemas.openxmlformats.org/officeDocument/2006/relationships" xmlns:p="http://schemas.openxmlformats.org/presentationml/2006/main">
+  <p:cSld>
+    <p:spTree>
+      <p:nvGrpSpPr>
+        <p:cNvPr id="1" name="">
+          <a:extLst>
+            <a:ext uri="{FF2B5EF4-FFF2-40B4-BE49-F238E27FC236}">
+              <a16:creationId xmlns:a16="http://schemas.microsoft.com/office/drawing/2014/main" id="{DBC552D9-4E63-1D9E-0164-8E8AAF287B74}"/>
+            </a:ext>
+          </a:extLst>
+        </p:cNvPr>
+        <p:cNvGrpSpPr/>
+        <p:nvPr/>
+      </p:nvGrpSpPr>
+      <p:grpSpPr>
+        <a:xfrm>
+          <a:off x="0" y="0"/>
+          <a:ext cx="0" cy="0"/>
+          <a:chOff x="0" y="0"/>
+          <a:chExt cx="0" cy="0"/>
+        </a:xfrm>
+      </p:grpSpPr>
+      <p:sp>
+        <p:nvSpPr>
+          <p:cNvPr id="2" name="Textfeld 1">
+            <a:extLst>
+              <a:ext uri="{FF2B5EF4-FFF2-40B4-BE49-F238E27FC236}">
+                <a16:creationId xmlns:a16="http://schemas.microsoft.com/office/drawing/2014/main" id="{C63BACAA-8A42-5149-C7EC-51C3751DAF00}"/>
+              </a:ext>
+            </a:extLst>
+          </p:cNvPr>
+          <p:cNvSpPr txBox="1"/>
+          <p:nvPr/>
+        </p:nvSpPr>
+        <p:spPr>
+          <a:xfrm>
+            <a:off x="616225" y="248478"/>
+            <a:ext cx="11575775" cy="874644"/>
+          </a:xfrm>
+          <a:prstGeom prst="rect">
+            <a:avLst/>
+          </a:prstGeom>
+          <a:noFill/>
+        </p:spPr>
+        <p:txBody>
+          <a:bodyPr wrap="square" rtlCol="0">
+            <a:noAutofit/>
+          </a:bodyPr>
+          <a:lstStyle/>
+          <a:p>
+            <a:r>
+              <a:rPr lang="de-DE" sz="3600" b="1" dirty="0">
+                <a:latin typeface="+mj-lt"/>
+              </a:rPr>
+              <a:t>Milestones 2 – V1 </a:t>
+            </a:r>
+            <a:r>
+              <a:rPr lang="de-DE" dirty="0">
+                <a:latin typeface="+mj-lt"/>
+              </a:rPr>
+              <a:t> </a:t>
+            </a:r>
+          </a:p>
+        </p:txBody>
+      </p:sp>
+      <p:sp>
+        <p:nvSpPr>
+          <p:cNvPr id="3" name="Textfeld 2">
+            <a:extLst>
+              <a:ext uri="{FF2B5EF4-FFF2-40B4-BE49-F238E27FC236}">
+                <a16:creationId xmlns:a16="http://schemas.microsoft.com/office/drawing/2014/main" id="{6B7D6449-C954-51BE-AC4B-F9A58A18AA8F}"/>
+              </a:ext>
+            </a:extLst>
+          </p:cNvPr>
+          <p:cNvSpPr txBox="1"/>
+          <p:nvPr/>
+        </p:nvSpPr>
+        <p:spPr>
+          <a:xfrm>
+            <a:off x="775252" y="1282148"/>
+            <a:ext cx="8338931" cy="4979504"/>
+          </a:xfrm>
+          <a:prstGeom prst="rect">
+            <a:avLst/>
+          </a:prstGeom>
+          <a:noFill/>
+        </p:spPr>
+        <p:txBody>
+          <a:bodyPr wrap="square" rtlCol="0">
+            <a:noAutofit/>
+          </a:bodyPr>
+          <a:lstStyle/>
+          <a:p>
+            <a:pPr marL="457200" indent="-457200">
+              <a:buFont typeface="Arial" panose="020B0604020202020204" pitchFamily="34" charset="0"/>
+              <a:buChar char="•"/>
+            </a:pPr>
+            <a:r>
+              <a:rPr lang="de-DE" sz="2800" dirty="0"/>
+              <a:t>Website mit dem Kamera-feed</a:t>
+            </a:r>
+          </a:p>
+          <a:p>
+            <a:pPr marL="457200" indent="-457200">
+              <a:buFont typeface="Arial" panose="020B0604020202020204" pitchFamily="34" charset="0"/>
+              <a:buChar char="•"/>
+            </a:pPr>
+            <a:r>
+              <a:rPr lang="de-DE" sz="2800" dirty="0"/>
+              <a:t>Live Videoübertragung</a:t>
+            </a:r>
+          </a:p>
+          <a:p>
+            <a:pPr marL="457200" indent="-457200">
+              <a:buFont typeface="Arial" panose="020B0604020202020204" pitchFamily="34" charset="0"/>
+              <a:buChar char="•"/>
+            </a:pPr>
+            <a:endParaRPr lang="de-DE" sz="2800" dirty="0"/>
+          </a:p>
+        </p:txBody>
+      </p:sp>
+    </p:spTree>
+    <p:extLst>
+      <p:ext uri="{BB962C8B-B14F-4D97-AF65-F5344CB8AC3E}">
+        <p14:creationId xmlns:p14="http://schemas.microsoft.com/office/powerpoint/2010/main" val="42915285"/>
+      </p:ext>
+    </p:extLst>
+  </p:cSld>
+  <p:clrMapOvr>
+    <a:masterClrMapping/>
+  </p:clrMapOvr>
+</p:sld>
+</file>
+
+<file path=ppt/slides/slide8.xml><?xml version="1.0" encoding="utf-8"?>
+<p:sld xmlns:a="http://schemas.openxmlformats.org/drawingml/2006/main" xmlns:r="http://schemas.openxmlformats.org/officeDocument/2006/relationships" xmlns:p="http://schemas.openxmlformats.org/presentationml/2006/main">
+  <p:cSld>
+    <p:spTree>
+      <p:nvGrpSpPr>
+        <p:cNvPr id="1" name="">
+          <a:extLst>
+            <a:ext uri="{FF2B5EF4-FFF2-40B4-BE49-F238E27FC236}">
+              <a16:creationId xmlns:a16="http://schemas.microsoft.com/office/drawing/2014/main" id="{0DA5651C-0BEB-7AE0-A9EE-FD268D7A4A5E}"/>
+            </a:ext>
+          </a:extLst>
+        </p:cNvPr>
+        <p:cNvGrpSpPr/>
+        <p:nvPr/>
+      </p:nvGrpSpPr>
+      <p:grpSpPr>
+        <a:xfrm>
+          <a:off x="0" y="0"/>
+          <a:ext cx="0" cy="0"/>
+          <a:chOff x="0" y="0"/>
+          <a:chExt cx="0" cy="0"/>
+        </a:xfrm>
+      </p:grpSpPr>
+      <p:sp>
+        <p:nvSpPr>
+          <p:cNvPr id="2" name="Textfeld 1">
+            <a:extLst>
+              <a:ext uri="{FF2B5EF4-FFF2-40B4-BE49-F238E27FC236}">
+                <a16:creationId xmlns:a16="http://schemas.microsoft.com/office/drawing/2014/main" id="{EE8F9013-5282-462D-669D-D90CE06DA9F7}"/>
+              </a:ext>
+            </a:extLst>
+          </p:cNvPr>
+          <p:cNvSpPr txBox="1"/>
+          <p:nvPr/>
+        </p:nvSpPr>
+        <p:spPr>
+          <a:xfrm>
+            <a:off x="616225" y="248478"/>
+            <a:ext cx="11575775" cy="874644"/>
+          </a:xfrm>
+          <a:prstGeom prst="rect">
+            <a:avLst/>
+          </a:prstGeom>
+          <a:noFill/>
+        </p:spPr>
+        <p:txBody>
+          <a:bodyPr wrap="square" rtlCol="0">
+            <a:noAutofit/>
+          </a:bodyPr>
+          <a:lstStyle/>
+          <a:p>
+            <a:r>
+              <a:rPr lang="de-DE" sz="3600" b="1" dirty="0">
+                <a:latin typeface="+mj-lt"/>
+              </a:rPr>
+              <a:t>Milestones 2 – V2</a:t>
+            </a:r>
+            <a:endParaRPr lang="de-DE" dirty="0">
+              <a:latin typeface="+mj-lt"/>
+            </a:endParaRPr>
+          </a:p>
+        </p:txBody>
+      </p:sp>
+      <p:sp>
+        <p:nvSpPr>
+          <p:cNvPr id="3" name="Textfeld 2">
+            <a:extLst>
+              <a:ext uri="{FF2B5EF4-FFF2-40B4-BE49-F238E27FC236}">
+                <a16:creationId xmlns:a16="http://schemas.microsoft.com/office/drawing/2014/main" id="{DD58CDD7-F934-DE1E-C043-063696E29C30}"/>
+              </a:ext>
+            </a:extLst>
+          </p:cNvPr>
+          <p:cNvSpPr txBox="1"/>
+          <p:nvPr/>
+        </p:nvSpPr>
+        <p:spPr>
+          <a:xfrm>
+            <a:off x="775252" y="1282148"/>
+            <a:ext cx="8338931" cy="4979504"/>
+          </a:xfrm>
+          <a:prstGeom prst="rect">
+            <a:avLst/>
+          </a:prstGeom>
+          <a:noFill/>
+        </p:spPr>
+        <p:txBody>
+          <a:bodyPr wrap="square" rtlCol="0">
+            <a:noAutofit/>
+          </a:bodyPr>
+          <a:lstStyle/>
+          <a:p>
+            <a:pPr marL="457200" indent="-457200">
+              <a:buFont typeface="Arial" panose="020B0604020202020204" pitchFamily="34" charset="0"/>
+              <a:buChar char="•"/>
+            </a:pPr>
+            <a:r>
+              <a:rPr lang="de-DE" sz="2800" dirty="0"/>
+              <a:t>Website mit dem Kamera-feed</a:t>
+            </a:r>
+          </a:p>
+          <a:p>
+            <a:pPr marL="457200" indent="-457200">
+              <a:buFont typeface="Arial" panose="020B0604020202020204" pitchFamily="34" charset="0"/>
+              <a:buChar char="•"/>
+            </a:pPr>
+            <a:r>
+              <a:rPr lang="de-DE" sz="2800" dirty="0"/>
+              <a:t>Live Videoübertragung</a:t>
+            </a:r>
+          </a:p>
+          <a:p>
+            <a:pPr marL="457200" indent="-457200">
+              <a:buFont typeface="Arial" panose="020B0604020202020204" pitchFamily="34" charset="0"/>
+              <a:buChar char="•"/>
+            </a:pPr>
+            <a:endParaRPr lang="de-DE" sz="2800" dirty="0"/>
+          </a:p>
+        </p:txBody>
+      </p:sp>
+    </p:spTree>
+    <p:extLst>
+      <p:ext uri="{BB962C8B-B14F-4D97-AF65-F5344CB8AC3E}">
+        <p14:creationId xmlns:p14="http://schemas.microsoft.com/office/powerpoint/2010/main" val="3818806465"/>
+      </p:ext>
+    </p:extLst>
+  </p:cSld>
+  <p:clrMapOvr>
+    <a:masterClrMapping/>
+  </p:clrMapOvr>
+</p:sld>
+</file>
+
+<file path=ppt/slides/slide9.xml><?xml version="1.0" encoding="utf-8"?>
 <p:sld xmlns:a="http://schemas.openxmlformats.org/drawingml/2006/main" xmlns:r="http://schemas.openxmlformats.org/officeDocument/2006/relationships" xmlns:p="http://schemas.openxmlformats.org/presentationml/2006/main">
   <p:cSld>
     <p:spTree>
@@ -4919,7 +5255,7 @@
           <p:cNvPr id="2" name="Textfeld 1">
             <a:extLst>
               <a:ext uri="{FF2B5EF4-FFF2-40B4-BE49-F238E27FC236}">
-                <a16:creationId xmlns:a16="http://schemas.microsoft.com/office/drawing/2014/main" id="{BC0B51EC-EEB9-9360-A11C-B8A9F4608EC3}"/>
+                <a16:creationId xmlns:a16="http://schemas.microsoft.com/office/drawing/2014/main" id="{8AA86B21-F8F3-54DB-5CFC-167E0D2E21D9}"/>
               </a:ext>
             </a:extLst>
           </p:cNvPr>
@@ -4946,7 +5282,7 @@
               <a:rPr lang="de-DE" sz="3600" b="1" dirty="0">
                 <a:latin typeface="+mj-lt"/>
               </a:rPr>
-              <a:t>Security Website</a:t>
+              <a:t>Hintereingang</a:t>
             </a:r>
             <a:r>
               <a:rPr lang="de-DE" dirty="0">
@@ -4962,7 +5298,7 @@
           <p:cNvPr id="3" name="Textfeld 2">
             <a:extLst>
               <a:ext uri="{FF2B5EF4-FFF2-40B4-BE49-F238E27FC236}">
-                <a16:creationId xmlns:a16="http://schemas.microsoft.com/office/drawing/2014/main" id="{074107CB-8008-E281-76A3-8CC614419D27}"/>
+                <a16:creationId xmlns:a16="http://schemas.microsoft.com/office/drawing/2014/main" id="{A2F0884C-9782-1D3D-161B-C44114174FDF}"/>
               </a:ext>
             </a:extLst>
           </p:cNvPr>
@@ -4991,13 +5327,28 @@
             </a:pPr>
             <a:r>
               <a:rPr lang="de-DE" sz="2800" dirty="0"/>
-              <a:t>Alle Aktivitäten werden </a:t>
-            </a:r>
-            <a:r>
-              <a:rPr lang="de-DE" sz="2800" dirty="0" err="1"/>
-              <a:t>gelogt</a:t>
-            </a:r>
-            <a:endParaRPr lang="de-DE" sz="2800" dirty="0"/>
+              <a:t>Bewegungssensor aktiviert eine Kamera</a:t>
+            </a:r>
+          </a:p>
+          <a:p>
+            <a:pPr marL="457200" indent="-457200">
+              <a:buFont typeface="Arial" panose="020B0604020202020204" pitchFamily="34" charset="0"/>
+              <a:buChar char="•"/>
+            </a:pPr>
+            <a:r>
+              <a:rPr lang="de-DE" sz="2800" dirty="0"/>
+              <a:t>Foto wird aufgenommen </a:t>
+            </a:r>
+          </a:p>
+          <a:p>
+            <a:pPr marL="457200" indent="-457200">
+              <a:buFont typeface="Arial" panose="020B0604020202020204" pitchFamily="34" charset="0"/>
+              <a:buChar char="•"/>
+            </a:pPr>
+            <a:r>
+              <a:rPr lang="de-DE" sz="2800" dirty="0"/>
+              <a:t>Fotos werden auf der Security Seite angezeigt</a:t>
+            </a:r>
           </a:p>
           <a:p>
             <a:pPr marL="457200" indent="-457200">
@@ -5018,7 +5369,7 @@
     </p:spTree>
     <p:extLst>
       <p:ext uri="{BB962C8B-B14F-4D97-AF65-F5344CB8AC3E}">
-        <p14:creationId xmlns:p14="http://schemas.microsoft.com/office/powerpoint/2010/main" val="4087257320"/>
+        <p14:creationId xmlns:p14="http://schemas.microsoft.com/office/powerpoint/2010/main" val="2838508329"/>
       </p:ext>
     </p:extLst>
   </p:cSld>

</xml_diff>